<commit_message>
Add project defense pptx
</commit_message>
<xml_diff>
--- a/docs/NLP_Project_Defense.pptx
+++ b/docs/NLP_Project_Defense.pptx
@@ -30,6 +30,13 @@
     <p:embeddedFont>
       <p:font typeface="Impact" panose="020B0806030902050204" pitchFamily="34" charset="0"/>
       <p:regular r:id="rId18"/>
+    </p:embeddedFont>
+    <p:embeddedFont>
+      <p:font typeface="Open Sans" panose="020B0606030504020204" pitchFamily="34" charset="0"/>
+      <p:regular r:id="rId19"/>
+      <p:bold r:id="rId20"/>
+      <p:italic r:id="rId21"/>
+      <p:boldItalic r:id="rId22"/>
     </p:embeddedFont>
   </p:embeddedFontLst>
   <p:defaultTextStyle>
@@ -1544,6 +1551,16 @@
               </a:spcAft>
               <a:buNone/>
             </a:pPr>
+            <a:r>
+              <a:rPr lang="en-US" b="0" i="0" u="none" strike="noStrike" dirty="0">
+                <a:solidFill>
+                  <a:srgbClr val="333333"/>
+                </a:solidFill>
+                <a:effectLst/>
+                <a:latin typeface="Open Sans" panose="020F0502020204030204" pitchFamily="34" charset="0"/>
+              </a:rPr>
+              <a:t>Hello everyone! Today, our team will share our findings on the comparison of two different detection methods—supervised and zero-shot—for identifying texts generated by large language models.</a:t>
+            </a:r>
             <a:endParaRPr dirty="0"/>
           </a:p>
         </p:txBody>
@@ -1703,6 +1720,16 @@
               </a:spcAft>
               <a:buNone/>
             </a:pPr>
+            <a:r>
+              <a:rPr lang="en-US" b="0" i="0" u="none" strike="noStrike" dirty="0">
+                <a:solidFill>
+                  <a:srgbClr val="333333"/>
+                </a:solidFill>
+                <a:effectLst/>
+                <a:latin typeface="Open Sans" panose="020B0606030504020204" pitchFamily="34" charset="0"/>
+              </a:rPr>
+              <a:t>Likewise, on the Chinese results, supervised outperformed zero-shot by a large margin. The supervised model’s recall of 94% means that it flagged almost all LLM samples, even if precision dipped to about 70%. Meanwhile, zero-shot managed a decent precision of 71% but only 18% on recall, so it was extremely conservative and missed most generated texts.</a:t>
+            </a:r>
             <a:endParaRPr dirty="0"/>
           </a:p>
         </p:txBody>
@@ -1872,6 +1899,16 @@
               </a:spcAft>
               <a:buNone/>
             </a:pPr>
+            <a:r>
+              <a:rPr lang="en-US" b="0" i="0" u="none" strike="noStrike" dirty="0">
+                <a:solidFill>
+                  <a:srgbClr val="333333"/>
+                </a:solidFill>
+                <a:effectLst/>
+                <a:latin typeface="Open Sans" panose="020B0606030504020204" pitchFamily="34" charset="0"/>
+              </a:rPr>
+              <a:t>Lastly, in multilingual setting, the supervised model still caught nearly all generated texts with 99% on recall but at the cost of misclassifying lots of human samples (as shown with the precision of 52%). Zero-shot again was conservative—higher precision at 69% but only 16% on recall. In both cases, the AUROC barely clears 55% to 60%, essentially close to random guessing.</a:t>
+            </a:r>
             <a:endParaRPr dirty="0"/>
           </a:p>
         </p:txBody>
@@ -1986,7 +2023,17 @@
               </a:spcAft>
               <a:buNone/>
             </a:pPr>
-            <a:endParaRPr/>
+            <a:r>
+              <a:rPr lang="en-US" b="0" i="0" u="none" strike="noStrike" dirty="0">
+                <a:solidFill>
+                  <a:srgbClr val="333333"/>
+                </a:solidFill>
+                <a:effectLst/>
+                <a:latin typeface="Open Sans" panose="020B0606030504020204" pitchFamily="34" charset="0"/>
+              </a:rPr>
+              <a:t>Before we wrap up, we would like to give some directions for future work.</a:t>
+            </a:r>
+            <a:endParaRPr dirty="0"/>
           </a:p>
         </p:txBody>
       </p:sp>
@@ -2145,6 +2192,16 @@
               </a:spcAft>
               <a:buNone/>
             </a:pPr>
+            <a:r>
+              <a:rPr lang="en-US" b="0" i="0" u="none" strike="noStrike" dirty="0">
+                <a:solidFill>
+                  <a:srgbClr val="333333"/>
+                </a:solidFill>
+                <a:effectLst/>
+                <a:latin typeface="Open Sans" panose="020B0606030504020204" pitchFamily="34" charset="0"/>
+              </a:rPr>
+              <a:t>One path is to explore alternative zero-shot methods—things like stylometric or syntactic features—that might boost recall without any labeled data. Another idea is to develop cross-lingual or language-agnostic detectors so that a single model handles new languages or domains more gracefully. Lastly, investigating advanced preprocessing strategies, such as data augmentation, could refine both approaches.</a:t>
+            </a:r>
             <a:endParaRPr dirty="0"/>
           </a:p>
         </p:txBody>
@@ -2259,6 +2316,16 @@
               </a:spcAft>
               <a:buNone/>
             </a:pPr>
+            <a:r>
+              <a:rPr lang="en-US" b="0" i="0" u="none" strike="noStrike" dirty="0">
+                <a:solidFill>
+                  <a:srgbClr val="333333"/>
+                </a:solidFill>
+                <a:effectLst/>
+                <a:latin typeface="Open Sans" panose="020B0606030504020204" pitchFamily="34" charset="0"/>
+              </a:rPr>
+              <a:t>That’s it from us. Thank you for listening. Let us know if you have any questions.</a:t>
+            </a:r>
             <a:endParaRPr dirty="0"/>
           </a:p>
         </p:txBody>
@@ -2527,6 +2594,16 @@
               </a:spcAft>
               <a:buNone/>
             </a:pPr>
+            <a:r>
+              <a:rPr lang="en-US" b="0" i="0" u="none" strike="noStrike" dirty="0">
+                <a:solidFill>
+                  <a:srgbClr val="333333"/>
+                </a:solidFill>
+                <a:effectLst/>
+                <a:latin typeface="Open Sans" panose="020F0502020204030204" pitchFamily="34" charset="0"/>
+              </a:rPr>
+              <a:t>We’ll begin with an overview of our methodology, then dive into the experiment results, and finally wrap up with some future directions. So let's begin.</a:t>
+            </a:r>
             <a:endParaRPr dirty="0"/>
           </a:p>
         </p:txBody>
@@ -2631,6 +2708,16 @@
               </a:spcAft>
               <a:buNone/>
             </a:pPr>
+            <a:r>
+              <a:rPr lang="en-US" b="0" i="0" u="none" strike="noStrike" dirty="0">
+                <a:solidFill>
+                  <a:srgbClr val="333333"/>
+                </a:solidFill>
+                <a:effectLst/>
+                <a:latin typeface="Open Sans" panose="020B0606030504020204" pitchFamily="34" charset="0"/>
+              </a:rPr>
+              <a:t>First, let’s talk about how we set things up.</a:t>
+            </a:r>
             <a:endParaRPr dirty="0"/>
           </a:p>
         </p:txBody>
@@ -2790,6 +2877,16 @@
               </a:spcAft>
               <a:buNone/>
             </a:pPr>
+            <a:r>
+              <a:rPr lang="en-US" b="0" i="0" u="none" strike="noStrike" dirty="0">
+                <a:solidFill>
+                  <a:srgbClr val="333333"/>
+                </a:solidFill>
+                <a:effectLst/>
+                <a:latin typeface="Open Sans" panose="020B0606030504020204" pitchFamily="34" charset="0"/>
+              </a:rPr>
+              <a:t>In this section, we kept our experimental setup straightforward. In data preprocessing, for the English setting, we took the "essay" domain for training and validation, leaving "wp" as our out-of-distribution or OOD test set. Similarly, in Chinese dataset, we trained and validated on "news" and reserved "wiki" for OOD. For the multilingual scenario, we simply combined the English "essay" texts with Chinese "news" texts for training and validation, and used "wp" plus "wiki" for testing.</a:t>
+            </a:r>
             <a:endParaRPr dirty="0"/>
           </a:p>
         </p:txBody>
@@ -2954,6 +3051,36 @@
               </a:spcAft>
               <a:buNone/>
             </a:pPr>
+            <a:r>
+              <a:rPr lang="en-US" b="0" i="0" u="none" strike="noStrike" dirty="0">
+                <a:solidFill>
+                  <a:srgbClr val="333333"/>
+                </a:solidFill>
+                <a:effectLst/>
+                <a:latin typeface="Open Sans" panose="020B0606030504020204" pitchFamily="34" charset="0"/>
+              </a:rPr>
+              <a:t>Also throughout this process, we found out that the generated texts of the English dataset outnumbered human texts by roughly six to one, so we randomly </a:t>
+            </a:r>
+            <a:r>
+              <a:rPr lang="en-US" b="0" i="0" u="none" strike="noStrike" dirty="0" err="1">
+                <a:solidFill>
+                  <a:srgbClr val="333333"/>
+                </a:solidFill>
+                <a:effectLst/>
+                <a:latin typeface="Open Sans" panose="020B0606030504020204" pitchFamily="34" charset="0"/>
+              </a:rPr>
+              <a:t>undersampled</a:t>
+            </a:r>
+            <a:r>
+              <a:rPr lang="en-US" b="0" i="0" u="none" strike="noStrike" dirty="0">
+                <a:solidFill>
+                  <a:srgbClr val="333333"/>
+                </a:solidFill>
+                <a:effectLst/>
+                <a:latin typeface="Open Sans" panose="020B0606030504020204" pitchFamily="34" charset="0"/>
+              </a:rPr>
+              <a:t> the generated data to keep the classes balanced. </a:t>
+            </a:r>
             <a:endParaRPr dirty="0"/>
           </a:p>
         </p:txBody>
@@ -3114,16 +3241,100 @@
           </a:bodyPr>
           <a:lstStyle/>
           <a:p>
-            <a:pPr marL="0" lvl="0" indent="0" algn="l" rtl="0">
-              <a:spcBef>
-                <a:spcPts val="0"/>
-              </a:spcBef>
-              <a:spcAft>
-                <a:spcPts val="0"/>
-              </a:spcAft>
-              <a:buNone/>
-            </a:pPr>
-            <a:endParaRPr dirty="0"/>
+            <a:pPr algn="l"/>
+            <a:r>
+              <a:rPr lang="en-US" b="0" i="0" u="none" strike="noStrike" dirty="0">
+                <a:solidFill>
+                  <a:srgbClr val="333333"/>
+                </a:solidFill>
+                <a:effectLst/>
+                <a:latin typeface="Open Sans" panose="020B0606030504020204" pitchFamily="34" charset="0"/>
+              </a:rPr>
+              <a:t>Then we pursued two distinct detection strategies.</a:t>
+            </a:r>
+          </a:p>
+          <a:p>
+            <a:pPr algn="l"/>
+            <a:endParaRPr lang="en-US" b="0" i="0" u="none" strike="noStrike" dirty="0">
+              <a:solidFill>
+                <a:srgbClr val="333333"/>
+              </a:solidFill>
+              <a:effectLst/>
+              <a:latin typeface="Open Sans" panose="020B0606030504020204" pitchFamily="34" charset="0"/>
+            </a:endParaRPr>
+          </a:p>
+          <a:p>
+            <a:pPr algn="l"/>
+            <a:r>
+              <a:rPr lang="en-US" b="0" i="0" u="none" strike="noStrike" dirty="0">
+                <a:solidFill>
+                  <a:srgbClr val="333333"/>
+                </a:solidFill>
+                <a:effectLst/>
+                <a:latin typeface="Open Sans" panose="020B0606030504020204" pitchFamily="34" charset="0"/>
+              </a:rPr>
+              <a:t>On the supervised side, we fine-tuned three versions of BERT: BERT-base-uncased for English, BERT</a:t>
+            </a:r>
+            <a:r>
+              <a:rPr lang="zh-CN" altLang="en-US" b="0" i="0" u="none" strike="noStrike" dirty="0">
+                <a:solidFill>
+                  <a:srgbClr val="333333"/>
+                </a:solidFill>
+                <a:effectLst/>
+                <a:latin typeface="Open Sans" panose="020B0606030504020204" pitchFamily="34" charset="0"/>
+              </a:rPr>
+              <a:t> </a:t>
+            </a:r>
+            <a:r>
+              <a:rPr lang="en-US" b="0" i="0" u="none" strike="noStrike" dirty="0">
+                <a:solidFill>
+                  <a:srgbClr val="333333"/>
+                </a:solidFill>
+                <a:effectLst/>
+                <a:latin typeface="Open Sans" panose="020B0606030504020204" pitchFamily="34" charset="0"/>
+              </a:rPr>
+              <a:t>base-</a:t>
+            </a:r>
+            <a:r>
+              <a:rPr lang="en-US" b="0" i="0" u="none" strike="noStrike" dirty="0" err="1">
+                <a:solidFill>
+                  <a:srgbClr val="333333"/>
+                </a:solidFill>
+                <a:effectLst/>
+                <a:latin typeface="Open Sans" panose="020B0606030504020204" pitchFamily="34" charset="0"/>
+              </a:rPr>
+              <a:t>chinese</a:t>
+            </a:r>
+            <a:r>
+              <a:rPr lang="en-US" b="0" i="0" u="none" strike="noStrike" dirty="0">
+                <a:solidFill>
+                  <a:srgbClr val="333333"/>
+                </a:solidFill>
+                <a:effectLst/>
+                <a:latin typeface="Open Sans" panose="020B0606030504020204" pitchFamily="34" charset="0"/>
+              </a:rPr>
+              <a:t> for Chinese, and BERT-base-multilingual-cased for the multilingual dataset. Each model</a:t>
+            </a:r>
+            <a:r>
+              <a:rPr lang="zh-CN" altLang="en-US" b="0" i="0" u="none" strike="noStrike" dirty="0">
+                <a:solidFill>
+                  <a:srgbClr val="333333"/>
+                </a:solidFill>
+                <a:effectLst/>
+                <a:latin typeface="Open Sans" panose="020B0606030504020204" pitchFamily="34" charset="0"/>
+              </a:rPr>
+              <a:t> </a:t>
+            </a:r>
+            <a:r>
+              <a:rPr lang="en-US" b="0" i="0" u="none" strike="noStrike" dirty="0">
+                <a:solidFill>
+                  <a:srgbClr val="333333"/>
+                </a:solidFill>
+                <a:effectLst/>
+                <a:latin typeface="Open Sans" panose="020B0606030504020204" pitchFamily="34" charset="0"/>
+              </a:rPr>
+              <a:t>learned from its respective training set and was evaluated on its own OOD test set.</a:t>
+            </a:r>
           </a:p>
         </p:txBody>
       </p:sp>
@@ -3292,6 +3503,96 @@
               </a:spcAft>
               <a:buNone/>
             </a:pPr>
+            <a:r>
+              <a:rPr lang="en-US" b="0" i="0" u="none" strike="noStrike" dirty="0">
+                <a:solidFill>
+                  <a:srgbClr val="333333"/>
+                </a:solidFill>
+                <a:effectLst/>
+                <a:latin typeface="Open Sans" panose="020B0606030504020204" pitchFamily="34" charset="0"/>
+              </a:rPr>
+              <a:t>On the zero-shot side, we followed the </a:t>
+            </a:r>
+            <a:r>
+              <a:rPr lang="en-US" b="0" i="0" u="none" strike="noStrike" dirty="0" err="1">
+                <a:solidFill>
+                  <a:srgbClr val="333333"/>
+                </a:solidFill>
+                <a:effectLst/>
+                <a:latin typeface="Open Sans" panose="020B0606030504020204" pitchFamily="34" charset="0"/>
+              </a:rPr>
+              <a:t>FourierGPT</a:t>
+            </a:r>
+            <a:r>
+              <a:rPr lang="en-US" b="0" i="0" u="none" strike="noStrike" dirty="0">
+                <a:solidFill>
+                  <a:srgbClr val="333333"/>
+                </a:solidFill>
+                <a:effectLst/>
+                <a:latin typeface="Open Sans" panose="020B0606030504020204" pitchFamily="34" charset="0"/>
+              </a:rPr>
+              <a:t> approach for detection, which hinges on computing spectrum of relative likelihood. In this experiment, we used Mistral-7B to score English samples and Qwen-7B to score both Chinese and multilingual samples. Moreover, we classified texts using a heuristic based on the power sum of the first </a:t>
+            </a:r>
+            <a:r>
+              <a:rPr lang="en-US" b="0" i="1" u="none" strike="noStrike" dirty="0">
+                <a:solidFill>
+                  <a:srgbClr val="333333"/>
+                </a:solidFill>
+                <a:effectLst/>
+                <a:latin typeface="Open Sans" panose="020B0606030504020204" pitchFamily="34" charset="0"/>
+              </a:rPr>
+              <a:t>k</a:t>
+            </a:r>
+            <a:r>
+              <a:rPr lang="en-US" b="0" i="0" u="none" strike="noStrike" dirty="0">
+                <a:solidFill>
+                  <a:srgbClr val="333333"/>
+                </a:solidFill>
+                <a:effectLst/>
+                <a:latin typeface="Open Sans" panose="020B0606030504020204" pitchFamily="34" charset="0"/>
+              </a:rPr>
+              <a:t> frequencies. We tuned </a:t>
+            </a:r>
+            <a:r>
+              <a:rPr lang="en-US" b="0" i="1" u="none" strike="noStrike" dirty="0">
+                <a:solidFill>
+                  <a:srgbClr val="333333"/>
+                </a:solidFill>
+                <a:effectLst/>
+                <a:latin typeface="Open Sans" panose="020B0606030504020204" pitchFamily="34" charset="0"/>
+              </a:rPr>
+              <a:t>k</a:t>
+            </a:r>
+            <a:r>
+              <a:rPr lang="en-US" b="0" i="0" u="none" strike="noStrike" dirty="0">
+                <a:solidFill>
+                  <a:srgbClr val="333333"/>
+                </a:solidFill>
+                <a:effectLst/>
+                <a:latin typeface="Open Sans" panose="020B0606030504020204" pitchFamily="34" charset="0"/>
+              </a:rPr>
+              <a:t> on the validation datasets to determine the best </a:t>
+            </a:r>
+            <a:r>
+              <a:rPr lang="en-US" b="0" i="1" u="none" strike="noStrike" dirty="0">
+                <a:solidFill>
+                  <a:srgbClr val="333333"/>
+                </a:solidFill>
+                <a:effectLst/>
+                <a:latin typeface="Open Sans" panose="020B0606030504020204" pitchFamily="34" charset="0"/>
+              </a:rPr>
+              <a:t>k</a:t>
+            </a:r>
+            <a:r>
+              <a:rPr lang="en-US" b="0" i="0" u="none" strike="noStrike" dirty="0">
+                <a:solidFill>
+                  <a:srgbClr val="333333"/>
+                </a:solidFill>
+                <a:effectLst/>
+                <a:latin typeface="Open Sans" panose="020B0606030504020204" pitchFamily="34" charset="0"/>
+              </a:rPr>
+              <a:t> value for testing.</a:t>
+            </a:r>
             <a:endParaRPr dirty="0"/>
           </a:p>
         </p:txBody>
@@ -3406,6 +3707,16 @@
               </a:spcAft>
               <a:buNone/>
             </a:pPr>
+            <a:r>
+              <a:rPr lang="en-US" b="0" i="0" u="none" strike="noStrike" dirty="0">
+                <a:solidFill>
+                  <a:srgbClr val="333333"/>
+                </a:solidFill>
+                <a:effectLst/>
+                <a:latin typeface="Open Sans" panose="020B0606030504020204" pitchFamily="34" charset="0"/>
+              </a:rPr>
+              <a:t>Now, let’s move on to the results section.</a:t>
+            </a:r>
             <a:endParaRPr dirty="0"/>
           </a:p>
         </p:txBody>
@@ -3565,6 +3876,16 @@
               </a:spcAft>
               <a:buNone/>
             </a:pPr>
+            <a:r>
+              <a:rPr lang="en-US" b="0" i="0" u="none" strike="noStrike" dirty="0">
+                <a:solidFill>
+                  <a:srgbClr val="333333"/>
+                </a:solidFill>
+                <a:effectLst/>
+                <a:latin typeface="Open Sans" panose="020B0606030504020204" pitchFamily="34" charset="0"/>
+              </a:rPr>
+              <a:t>Let's first discuss the English results. Here, supervised learning performed very well, hitting over 85% accuracy and 93% AUROC. In contrast, zero-shot accuracy hovered near 53%, with a low recall of about 40%. In other words, the fine-tuned model caught most LLM-generated texts, while zero-shot missed a majority.</a:t>
+            </a:r>
             <a:endParaRPr dirty="0"/>
           </a:p>
         </p:txBody>
@@ -14052,27 +14373,7 @@
                   <a:srgbClr val="173E42"/>
                 </a:solidFill>
               </a:rPr>
-              <a:t>Hok Layheng</a:t>
-            </a:r>
-            <a:r>
-              <a:rPr lang="en-US" sz="1800" b="1" dirty="0">
-                <a:solidFill>
-                  <a:srgbClr val="173E42"/>
-                </a:solidFill>
-                <a:latin typeface="Arial"/>
-                <a:ea typeface="Arial"/>
-                <a:cs typeface="Arial"/>
-                <a:sym typeface="Arial"/>
-              </a:rPr>
-              <a:t>		              </a:t>
-            </a:r>
-            <a:r>
-              <a:rPr lang="en-US" sz="1800" b="1" dirty="0">
-                <a:solidFill>
-                  <a:srgbClr val="173E42"/>
-                </a:solidFill>
-              </a:rPr>
-              <a:t>12210736</a:t>
+              <a:t>Hok Layheng			12210736</a:t>
             </a:r>
             <a:endParaRPr b="1" dirty="0"/>
           </a:p>
@@ -14092,18 +14393,10 @@
                   <a:srgbClr val="173E42"/>
                 </a:solidFill>
               </a:rPr>
-              <a:t>Harrold Tok Kwan Hang   </a:t>
+              <a:t>Harrold Tok Kwan Hang   	</a:t>
             </a:r>
             <a:r>
-              <a:rPr lang="en-US" sz="1800" b="1">
-                <a:solidFill>
-                  <a:srgbClr val="173E42"/>
-                </a:solidFill>
-              </a:rPr>
-              <a:t>	</a:t>
-            </a:r>
-            <a:r>
-              <a:rPr lang="en-US" sz="1800" b="1">
+              <a:rPr lang="en-US" sz="1800" b="1" dirty="0">
                 <a:solidFill>
                   <a:srgbClr val="173E42"/>
                 </a:solidFill>

</xml_diff>